<commit_message>
mai trebuie repara alu_top_2.v
</commit_message>
<xml_diff>
--- a/Proiect CN ALU.pptx
+++ b/Proiect CN ALU.pptx
@@ -3239,12 +3239,50 @@
           <a:chExt cx="0" cy="0"/>
         </a:xfrm>
       </p:grpSpPr>
+      <p:sp>
+        <p:nvSpPr>
+          <p:cNvPr id="4" name="TextBox 3">
+            <a:extLst>
+              <a:ext uri="{FF2B5EF4-FFF2-40B4-BE49-F238E27FC236}">
+                <a16:creationId xmlns:a16="http://schemas.microsoft.com/office/drawing/2014/main" id="{7F5B5782-2F5A-EBBF-934C-B85D48FE22AA}"/>
+              </a:ext>
+            </a:extLst>
+          </p:cNvPr>
+          <p:cNvSpPr txBox="1"/>
+          <p:nvPr/>
+        </p:nvSpPr>
+        <p:spPr>
+          <a:xfrm>
+            <a:off x="1476505" y="539750"/>
+            <a:ext cx="6190990" cy="646331"/>
+          </a:xfrm>
+          <a:prstGeom prst="rect">
+            <a:avLst/>
+          </a:prstGeom>
+          <a:noFill/>
+        </p:spPr>
+        <p:txBody>
+          <a:bodyPr wrap="none" rtlCol="0">
+            <a:spAutoFit/>
+          </a:bodyPr>
+          <a:lstStyle/>
+          <a:p>
+            <a:r>
+              <a:rPr lang="ro-RO" sz="3600" b="1" dirty="0">
+                <a:latin typeface="Times New Roman" panose="02020603050405020304" pitchFamily="18" charset="0"/>
+                <a:cs typeface="Times New Roman" panose="02020603050405020304" pitchFamily="18" charset="0"/>
+              </a:rPr>
+              <a:t>Diagrama de functionare ALU</a:t>
+            </a:r>
+          </a:p>
+        </p:txBody>
+      </p:sp>
       <p:pic>
         <p:nvPicPr>
-          <p:cNvPr id="3" name="Picture 2">
+          <p:cNvPr id="5" name="Picture 4" descr="A diagram of a company&#10;&#10;AI-generated content may be incorrect.">
             <a:extLst>
               <a:ext uri="{FF2B5EF4-FFF2-40B4-BE49-F238E27FC236}">
-                <a16:creationId xmlns:a16="http://schemas.microsoft.com/office/drawing/2014/main" id="{5FF0FB56-9BBF-9F8F-2A4E-3D7C74E63627}"/>
+                <a16:creationId xmlns:a16="http://schemas.microsoft.com/office/drawing/2014/main" id="{64C743FE-A8B1-0098-E3F2-C90469C90D9B}"/>
               </a:ext>
             </a:extLst>
           </p:cNvPr>
@@ -3267,52 +3305,14 @@
         </p:blipFill>
         <p:spPr>
           <a:xfrm>
-            <a:off x="1380112" y="1748723"/>
-            <a:ext cx="6383776" cy="4476273"/>
+            <a:off x="0" y="1888581"/>
+            <a:ext cx="9144000" cy="3859436"/>
           </a:xfrm>
           <a:prstGeom prst="rect">
             <a:avLst/>
           </a:prstGeom>
         </p:spPr>
       </p:pic>
-      <p:sp>
-        <p:nvSpPr>
-          <p:cNvPr id="4" name="TextBox 3">
-            <a:extLst>
-              <a:ext uri="{FF2B5EF4-FFF2-40B4-BE49-F238E27FC236}">
-                <a16:creationId xmlns:a16="http://schemas.microsoft.com/office/drawing/2014/main" id="{7F5B5782-2F5A-EBBF-934C-B85D48FE22AA}"/>
-              </a:ext>
-            </a:extLst>
-          </p:cNvPr>
-          <p:cNvSpPr txBox="1"/>
-          <p:nvPr/>
-        </p:nvSpPr>
-        <p:spPr>
-          <a:xfrm>
-            <a:off x="1476505" y="539750"/>
-            <a:ext cx="6190990" cy="646331"/>
-          </a:xfrm>
-          <a:prstGeom prst="rect">
-            <a:avLst/>
-          </a:prstGeom>
-          <a:noFill/>
-        </p:spPr>
-        <p:txBody>
-          <a:bodyPr wrap="none" rtlCol="0">
-            <a:spAutoFit/>
-          </a:bodyPr>
-          <a:lstStyle/>
-          <a:p>
-            <a:r>
-              <a:rPr lang="ro-RO" sz="3600" b="1" dirty="0">
-                <a:latin typeface="Times New Roman" panose="02020603050405020304" pitchFamily="18" charset="0"/>
-                <a:cs typeface="Times New Roman" panose="02020603050405020304" pitchFamily="18" charset="0"/>
-              </a:rPr>
-              <a:t>Diagrama de functionare ALU</a:t>
-            </a:r>
-          </a:p>
-        </p:txBody>
-      </p:sp>
     </p:spTree>
     <p:extLst>
       <p:ext uri="{BB962C8B-B14F-4D97-AF65-F5344CB8AC3E}">

</xml_diff>